<commit_message>
update readme and ppt
</commit_message>
<xml_diff>
--- a/Final Project_portfolio optimisation.pptx
+++ b/Final Project_portfolio optimisation.pptx
@@ -9,6 +9,12 @@
     <p:sldId id="260" r:id="rId3"/>
     <p:sldId id="259" r:id="rId4"/>
     <p:sldId id="261" r:id="rId5"/>
+    <p:sldId id="262" r:id="rId6"/>
+    <p:sldId id="263" r:id="rId7"/>
+    <p:sldId id="264" r:id="rId8"/>
+    <p:sldId id="265" r:id="rId9"/>
+    <p:sldId id="266" r:id="rId10"/>
+    <p:sldId id="267" r:id="rId11"/>
   </p:sldIdLst>
   <p:sldSz cx="12192000" cy="6858000"/>
   <p:notesSz cx="6858000" cy="9144000"/>
@@ -264,7 +270,7 @@
           <a:p>
             <a:fld id="{60D1E923-7CB1-4592-99E2-DF465806760B}" type="datetimeFigureOut">
               <a:rPr lang="zh-CN" altLang="en-US" smtClean="0"/>
-              <a:t>2021/2/17</a:t>
+              <a:t>2021/2/19</a:t>
             </a:fld>
             <a:endParaRPr lang="zh-CN" altLang="en-US"/>
           </a:p>
@@ -464,7 +470,7 @@
           <a:p>
             <a:fld id="{60D1E923-7CB1-4592-99E2-DF465806760B}" type="datetimeFigureOut">
               <a:rPr lang="zh-CN" altLang="en-US" smtClean="0"/>
-              <a:t>2021/2/17</a:t>
+              <a:t>2021/2/19</a:t>
             </a:fld>
             <a:endParaRPr lang="zh-CN" altLang="en-US"/>
           </a:p>
@@ -674,7 +680,7 @@
           <a:p>
             <a:fld id="{60D1E923-7CB1-4592-99E2-DF465806760B}" type="datetimeFigureOut">
               <a:rPr lang="zh-CN" altLang="en-US" smtClean="0"/>
-              <a:t>2021/2/17</a:t>
+              <a:t>2021/2/19</a:t>
             </a:fld>
             <a:endParaRPr lang="zh-CN" altLang="en-US"/>
           </a:p>
@@ -874,7 +880,7 @@
           <a:p>
             <a:fld id="{60D1E923-7CB1-4592-99E2-DF465806760B}" type="datetimeFigureOut">
               <a:rPr lang="zh-CN" altLang="en-US" smtClean="0"/>
-              <a:t>2021/2/17</a:t>
+              <a:t>2021/2/19</a:t>
             </a:fld>
             <a:endParaRPr lang="zh-CN" altLang="en-US"/>
           </a:p>
@@ -1150,7 +1156,7 @@
           <a:p>
             <a:fld id="{60D1E923-7CB1-4592-99E2-DF465806760B}" type="datetimeFigureOut">
               <a:rPr lang="zh-CN" altLang="en-US" smtClean="0"/>
-              <a:t>2021/2/17</a:t>
+              <a:t>2021/2/19</a:t>
             </a:fld>
             <a:endParaRPr lang="zh-CN" altLang="en-US"/>
           </a:p>
@@ -1418,7 +1424,7 @@
           <a:p>
             <a:fld id="{60D1E923-7CB1-4592-99E2-DF465806760B}" type="datetimeFigureOut">
               <a:rPr lang="zh-CN" altLang="en-US" smtClean="0"/>
-              <a:t>2021/2/17</a:t>
+              <a:t>2021/2/19</a:t>
             </a:fld>
             <a:endParaRPr lang="zh-CN" altLang="en-US"/>
           </a:p>
@@ -1833,7 +1839,7 @@
           <a:p>
             <a:fld id="{60D1E923-7CB1-4592-99E2-DF465806760B}" type="datetimeFigureOut">
               <a:rPr lang="zh-CN" altLang="en-US" smtClean="0"/>
-              <a:t>2021/2/17</a:t>
+              <a:t>2021/2/19</a:t>
             </a:fld>
             <a:endParaRPr lang="zh-CN" altLang="en-US"/>
           </a:p>
@@ -1975,7 +1981,7 @@
           <a:p>
             <a:fld id="{60D1E923-7CB1-4592-99E2-DF465806760B}" type="datetimeFigureOut">
               <a:rPr lang="zh-CN" altLang="en-US" smtClean="0"/>
-              <a:t>2021/2/17</a:t>
+              <a:t>2021/2/19</a:t>
             </a:fld>
             <a:endParaRPr lang="zh-CN" altLang="en-US"/>
           </a:p>
@@ -2088,7 +2094,7 @@
           <a:p>
             <a:fld id="{60D1E923-7CB1-4592-99E2-DF465806760B}" type="datetimeFigureOut">
               <a:rPr lang="zh-CN" altLang="en-US" smtClean="0"/>
-              <a:t>2021/2/17</a:t>
+              <a:t>2021/2/19</a:t>
             </a:fld>
             <a:endParaRPr lang="zh-CN" altLang="en-US"/>
           </a:p>
@@ -2401,7 +2407,7 @@
           <a:p>
             <a:fld id="{60D1E923-7CB1-4592-99E2-DF465806760B}" type="datetimeFigureOut">
               <a:rPr lang="zh-CN" altLang="en-US" smtClean="0"/>
-              <a:t>2021/2/17</a:t>
+              <a:t>2021/2/19</a:t>
             </a:fld>
             <a:endParaRPr lang="zh-CN" altLang="en-US"/>
           </a:p>
@@ -2690,7 +2696,7 @@
           <a:p>
             <a:fld id="{60D1E923-7CB1-4592-99E2-DF465806760B}" type="datetimeFigureOut">
               <a:rPr lang="zh-CN" altLang="en-US" smtClean="0"/>
-              <a:t>2021/2/17</a:t>
+              <a:t>2021/2/19</a:t>
             </a:fld>
             <a:endParaRPr lang="zh-CN" altLang="en-US"/>
           </a:p>
@@ -2933,7 +2939,7 @@
           <a:p>
             <a:fld id="{60D1E923-7CB1-4592-99E2-DF465806760B}" type="datetimeFigureOut">
               <a:rPr lang="zh-CN" altLang="en-US" smtClean="0"/>
-              <a:t>2021/2/17</a:t>
+              <a:t>2021/2/19</a:t>
             </a:fld>
             <a:endParaRPr lang="zh-CN" altLang="en-US"/>
           </a:p>
@@ -3493,6 +3499,106 @@
   </p:cSld>
   <p:clrMapOvr>
     <a:overrideClrMapping bg1="dk1" tx1="lt1" bg2="dk2" tx2="lt2" accent1="accent1" accent2="accent2" accent3="accent3" accent4="accent4" accent5="accent5" accent6="accent6" hlink="hlink" folHlink="folHlink"/>
+  </p:clrMapOvr>
+</p:sld>
+</file>
+
+<file path=ppt/slides/slide10.xml><?xml version="1.0" encoding="utf-8"?>
+<p:sld xmlns:a="http://schemas.openxmlformats.org/drawingml/2006/main" xmlns:r="http://schemas.openxmlformats.org/officeDocument/2006/relationships" xmlns:p="http://schemas.openxmlformats.org/presentationml/2006/main">
+  <p:cSld>
+    <p:spTree>
+      <p:nvGrpSpPr>
+        <p:cNvPr id="1" name=""/>
+        <p:cNvGrpSpPr/>
+        <p:nvPr/>
+      </p:nvGrpSpPr>
+      <p:grpSpPr>
+        <a:xfrm>
+          <a:off x="0" y="0"/>
+          <a:ext cx="0" cy="0"/>
+          <a:chOff x="0" y="0"/>
+          <a:chExt cx="0" cy="0"/>
+        </a:xfrm>
+      </p:grpSpPr>
+      <p:sp>
+        <p:nvSpPr>
+          <p:cNvPr id="2" name="Titel 1">
+            <a:extLst>
+              <a:ext uri="{FF2B5EF4-FFF2-40B4-BE49-F238E27FC236}">
+                <a16:creationId xmlns:a16="http://schemas.microsoft.com/office/drawing/2014/main" id="{384F86DE-A6D1-45F4-9088-968A355F1251}"/>
+              </a:ext>
+            </a:extLst>
+          </p:cNvPr>
+          <p:cNvSpPr>
+            <a:spLocks noGrp="1"/>
+          </p:cNvSpPr>
+          <p:nvPr>
+            <p:ph type="title"/>
+          </p:nvPr>
+        </p:nvSpPr>
+        <p:spPr/>
+        <p:txBody>
+          <a:bodyPr/>
+          <a:lstStyle/>
+          <a:p>
+            <a:r>
+              <a:rPr lang="de-DE" altLang="zh-CN" dirty="0"/>
+              <a:t>Classification </a:t>
+            </a:r>
+            <a:r>
+              <a:rPr lang="de-DE" altLang="zh-CN" dirty="0" err="1"/>
+              <a:t>with</a:t>
+            </a:r>
+            <a:r>
+              <a:rPr lang="de-DE" altLang="zh-CN" dirty="0"/>
+              <a:t> 1.883 different </a:t>
+            </a:r>
+            <a:r>
+              <a:rPr lang="de-DE" altLang="zh-CN" dirty="0" err="1"/>
+              <a:t>coins</a:t>
+            </a:r>
+            <a:endParaRPr lang="zh-CN" altLang="en-US" dirty="0"/>
+          </a:p>
+        </p:txBody>
+      </p:sp>
+      <p:pic>
+        <p:nvPicPr>
+          <p:cNvPr id="13" name="Inhaltsplatzhalter 12">
+            <a:extLst>
+              <a:ext uri="{FF2B5EF4-FFF2-40B4-BE49-F238E27FC236}">
+                <a16:creationId xmlns:a16="http://schemas.microsoft.com/office/drawing/2014/main" id="{11B7ECC8-0E68-43E9-916A-E2F925B592D3}"/>
+              </a:ext>
+            </a:extLst>
+          </p:cNvPr>
+          <p:cNvPicPr>
+            <a:picLocks noGrp="1" noChangeAspect="1"/>
+          </p:cNvPicPr>
+          <p:nvPr>
+            <p:ph idx="1"/>
+          </p:nvPr>
+        </p:nvPicPr>
+        <p:blipFill>
+          <a:blip r:embed="rId2"/>
+          <a:stretch>
+            <a:fillRect/>
+          </a:stretch>
+        </p:blipFill>
+        <p:spPr>
+          <a:xfrm>
+            <a:off x="1125416" y="1420837"/>
+            <a:ext cx="9594166" cy="5072038"/>
+          </a:xfrm>
+        </p:spPr>
+      </p:pic>
+    </p:spTree>
+    <p:extLst>
+      <p:ext uri="{BB962C8B-B14F-4D97-AF65-F5344CB8AC3E}">
+        <p14:creationId xmlns:p14="http://schemas.microsoft.com/office/powerpoint/2010/main" val="1265137068"/>
+      </p:ext>
+    </p:extLst>
+  </p:cSld>
+  <p:clrMapOvr>
+    <a:masterClrMapping/>
   </p:clrMapOvr>
 </p:sld>
 </file>
@@ -5189,7 +5295,7 @@
         <p:spPr>
           <a:xfrm>
             <a:off x="5358384" y="640263"/>
-            <a:ext cx="6028944" cy="5254510"/>
+            <a:ext cx="6028944" cy="1554297"/>
           </a:xfrm>
         </p:spPr>
         <p:txBody>
@@ -5207,7 +5313,55 @@
                   <a:schemeClr val="bg1"/>
                 </a:solidFill>
               </a:rPr>
-              <a:t>Data : Through API </a:t>
+              <a:t>Data : </a:t>
+            </a:r>
+            <a:r>
+              <a:rPr lang="de-DE" altLang="zh-CN" sz="2200" dirty="0" err="1">
+                <a:solidFill>
+                  <a:schemeClr val="bg1"/>
+                </a:solidFill>
+              </a:rPr>
+              <a:t>downloaded</a:t>
+            </a:r>
+            <a:r>
+              <a:rPr lang="de-DE" altLang="zh-CN" sz="2200" dirty="0">
+                <a:solidFill>
+                  <a:schemeClr val="bg1"/>
+                </a:solidFill>
+              </a:rPr>
+              <a:t> </a:t>
+            </a:r>
+            <a:r>
+              <a:rPr lang="de-DE" altLang="zh-CN" sz="2200" dirty="0" err="1">
+                <a:solidFill>
+                  <a:schemeClr val="bg1"/>
+                </a:solidFill>
+              </a:rPr>
+              <a:t>from</a:t>
+            </a:r>
+            <a:r>
+              <a:rPr lang="de-DE" altLang="zh-CN" sz="2200" dirty="0">
+                <a:solidFill>
+                  <a:schemeClr val="bg1"/>
+                </a:solidFill>
+              </a:rPr>
+              <a:t> </a:t>
+            </a:r>
+            <a:r>
+              <a:rPr lang="de-DE" altLang="zh-CN" sz="2200" dirty="0" err="1">
+                <a:solidFill>
+                  <a:schemeClr val="bg1"/>
+                </a:solidFill>
+              </a:rPr>
+              <a:t>Coingecko</a:t>
+            </a:r>
+            <a:r>
+              <a:rPr lang="de-DE" altLang="zh-CN" sz="2200" dirty="0">
+                <a:solidFill>
+                  <a:schemeClr val="bg1"/>
+                </a:solidFill>
+              </a:rPr>
+              <a:t> API </a:t>
             </a:r>
           </a:p>
           <a:p>
@@ -5428,6 +5582,22 @@
                   <a:schemeClr val="bg1"/>
                 </a:solidFill>
               </a:rPr>
+              <a:t>for</a:t>
+            </a:r>
+            <a:r>
+              <a:rPr lang="de-DE" altLang="zh-CN" sz="2200" dirty="0">
+                <a:solidFill>
+                  <a:schemeClr val="bg1"/>
+                </a:solidFill>
+              </a:rPr>
+              <a:t> </a:t>
+            </a:r>
+            <a:r>
+              <a:rPr lang="de-DE" altLang="zh-CN" sz="2200" dirty="0" err="1">
+                <a:solidFill>
+                  <a:schemeClr val="bg1"/>
+                </a:solidFill>
+              </a:rPr>
               <a:t>stocks</a:t>
             </a:r>
             <a:r>
@@ -5461,6 +5631,36 @@
           </a:p>
         </p:txBody>
       </p:sp>
+      <p:pic>
+        <p:nvPicPr>
+          <p:cNvPr id="3" name="Grafik 2">
+            <a:extLst>
+              <a:ext uri="{FF2B5EF4-FFF2-40B4-BE49-F238E27FC236}">
+                <a16:creationId xmlns:a16="http://schemas.microsoft.com/office/drawing/2014/main" id="{7DA5B8A6-ECCC-4EF2-8C09-B4035B6DE27B}"/>
+              </a:ext>
+            </a:extLst>
+          </p:cNvPr>
+          <p:cNvPicPr>
+            <a:picLocks noChangeAspect="1"/>
+          </p:cNvPicPr>
+          <p:nvPr/>
+        </p:nvPicPr>
+        <p:blipFill>
+          <a:blip r:embed="rId2"/>
+          <a:stretch>
+            <a:fillRect/>
+          </a:stretch>
+        </p:blipFill>
+        <p:spPr>
+          <a:xfrm>
+            <a:off x="5358384" y="2194560"/>
+            <a:ext cx="6429375" cy="3762375"/>
+          </a:xfrm>
+          <a:prstGeom prst="rect">
+            <a:avLst/>
+          </a:prstGeom>
+        </p:spPr>
+      </p:pic>
     </p:spTree>
     <p:extLst>
       <p:ext uri="{BB962C8B-B14F-4D97-AF65-F5344CB8AC3E}">
@@ -5470,6 +5670,1299 @@
   </p:cSld>
   <p:clrMapOvr>
     <a:overrideClrMapping bg1="dk1" tx1="lt1" bg2="dk2" tx2="lt2" accent1="accent1" accent2="accent2" accent3="accent3" accent4="accent4" accent5="accent5" accent6="accent6" hlink="hlink" folHlink="folHlink"/>
+  </p:clrMapOvr>
+</p:sld>
+</file>
+
+<file path=ppt/slides/slide5.xml><?xml version="1.0" encoding="utf-8"?>
+<p:sld xmlns:a="http://schemas.openxmlformats.org/drawingml/2006/main" xmlns:r="http://schemas.openxmlformats.org/officeDocument/2006/relationships" xmlns:p="http://schemas.openxmlformats.org/presentationml/2006/main">
+  <p:cSld>
+    <p:bg>
+      <p:bgPr>
+        <a:solidFill>
+          <a:schemeClr val="bg1"/>
+        </a:solidFill>
+        <a:effectLst/>
+      </p:bgPr>
+    </p:bg>
+    <p:spTree>
+      <p:nvGrpSpPr>
+        <p:cNvPr id="1" name=""/>
+        <p:cNvGrpSpPr/>
+        <p:nvPr/>
+      </p:nvGrpSpPr>
+      <p:grpSpPr>
+        <a:xfrm>
+          <a:off x="0" y="0"/>
+          <a:ext cx="0" cy="0"/>
+          <a:chOff x="0" y="0"/>
+          <a:chExt cx="0" cy="0"/>
+        </a:xfrm>
+      </p:grpSpPr>
+      <p:sp>
+        <p:nvSpPr>
+          <p:cNvPr id="21" name="Rectangle 20">
+            <a:extLst>
+              <a:ext uri="{FF2B5EF4-FFF2-40B4-BE49-F238E27FC236}">
+                <a16:creationId xmlns:a16="http://schemas.microsoft.com/office/drawing/2014/main" id="{823AC064-BC96-4F32-8AE1-B2FD38754823}"/>
+              </a:ext>
+              <a:ext uri="{C183D7F6-B498-43B3-948B-1728B52AA6E4}">
+                <adec:decorative xmlns:adec="http://schemas.microsoft.com/office/drawing/2017/decorative" val="1"/>
+              </a:ext>
+            </a:extLst>
+          </p:cNvPr>
+          <p:cNvSpPr>
+            <a:spLocks noGrp="1" noRot="1" noChangeAspect="1" noMove="1" noResize="1" noEditPoints="1" noAdjustHandles="1" noChangeArrowheads="1" noChangeShapeType="1" noTextEdit="1"/>
+          </p:cNvSpPr>
+          <p:nvPr>
+            <p:extLst>
+              <p:ext uri="{386F3935-93C4-4BCD-93E2-E3B085C9AB24}">
+                <p16:designElem xmlns:p16="http://schemas.microsoft.com/office/powerpoint/2015/main" val="1"/>
+              </p:ext>
+            </p:extLst>
+          </p:nvPr>
+        </p:nvSpPr>
+        <p:spPr bwMode="ltGray">
+          <a:xfrm>
+            <a:off x="396882" y="280374"/>
+            <a:ext cx="11438793" cy="1844256"/>
+          </a:xfrm>
+          <a:prstGeom prst="rect">
+            <a:avLst/>
+          </a:prstGeom>
+          <a:solidFill>
+            <a:srgbClr val="404040"/>
+          </a:solidFill>
+          <a:ln w="127000" cap="sq" cmpd="thinThick">
+            <a:solidFill>
+              <a:srgbClr val="404040"/>
+            </a:solidFill>
+          </a:ln>
+        </p:spPr>
+        <p:style>
+          <a:lnRef idx="2">
+            <a:schemeClr val="accent1">
+              <a:shade val="50000"/>
+            </a:schemeClr>
+          </a:lnRef>
+          <a:fillRef idx="1">
+            <a:schemeClr val="accent1"/>
+          </a:fillRef>
+          <a:effectRef idx="0">
+            <a:schemeClr val="accent1"/>
+          </a:effectRef>
+          <a:fontRef idx="minor">
+            <a:schemeClr val="lt1"/>
+          </a:fontRef>
+        </p:style>
+        <p:txBody>
+          <a:bodyPr rtlCol="0" anchor="ctr"/>
+          <a:lstStyle/>
+          <a:p>
+            <a:pPr algn="ctr"/>
+            <a:endParaRPr lang="en-US"/>
+          </a:p>
+        </p:txBody>
+      </p:sp>
+      <p:sp>
+        <p:nvSpPr>
+          <p:cNvPr id="2" name="Titel 1">
+            <a:extLst>
+              <a:ext uri="{FF2B5EF4-FFF2-40B4-BE49-F238E27FC236}">
+                <a16:creationId xmlns:a16="http://schemas.microsoft.com/office/drawing/2014/main" id="{1F951854-C038-4E0A-B2C7-B8290C8E328F}"/>
+              </a:ext>
+            </a:extLst>
+          </p:cNvPr>
+          <p:cNvSpPr>
+            <a:spLocks noGrp="1"/>
+          </p:cNvSpPr>
+          <p:nvPr>
+            <p:ph type="title"/>
+          </p:nvPr>
+        </p:nvSpPr>
+        <p:spPr>
+          <a:xfrm>
+            <a:off x="546351" y="433545"/>
+            <a:ext cx="11139854" cy="930447"/>
+          </a:xfrm>
+        </p:spPr>
+        <p:txBody>
+          <a:bodyPr vert="horz" lIns="91440" tIns="45720" rIns="91440" bIns="45720" rtlCol="0" anchor="b">
+            <a:normAutofit/>
+          </a:bodyPr>
+          <a:lstStyle/>
+          <a:p>
+            <a:pPr algn="ctr"/>
+            <a:r>
+              <a:rPr lang="en-US" altLang="zh-CN" sz="3400">
+                <a:solidFill>
+                  <a:srgbClr val="FFFFFF"/>
+                </a:solidFill>
+              </a:rPr>
+              <a:t>Applying Monte Carlo Simulation to optimize the portfolio</a:t>
+            </a:r>
+          </a:p>
+        </p:txBody>
+      </p:sp>
+      <p:cxnSp>
+        <p:nvCxnSpPr>
+          <p:cNvPr id="23" name="Straight Connector 22">
+            <a:extLst>
+              <a:ext uri="{FF2B5EF4-FFF2-40B4-BE49-F238E27FC236}">
+                <a16:creationId xmlns:a16="http://schemas.microsoft.com/office/drawing/2014/main" id="{7E7C77BC-7138-40B1-A15B-20F57A494629}"/>
+              </a:ext>
+              <a:ext uri="{C183D7F6-B498-43B3-948B-1728B52AA6E4}">
+                <adec:decorative xmlns:adec="http://schemas.microsoft.com/office/drawing/2017/decorative" val="1"/>
+              </a:ext>
+            </a:extLst>
+          </p:cNvPr>
+          <p:cNvCxnSpPr>
+            <a:cxnSpLocks noGrp="1" noRot="1" noChangeAspect="1" noMove="1" noResize="1" noEditPoints="1" noAdjustHandles="1" noChangeArrowheads="1" noChangeShapeType="1"/>
+          </p:cNvCxnSpPr>
+          <p:nvPr>
+            <p:extLst>
+              <p:ext uri="{386F3935-93C4-4BCD-93E2-E3B085C9AB24}">
+                <p16:designElem xmlns:p16="http://schemas.microsoft.com/office/powerpoint/2015/main" val="1"/>
+              </p:ext>
+            </p:extLst>
+          </p:nvPr>
+        </p:nvCxnSpPr>
+        <p:spPr>
+          <a:xfrm>
+            <a:off x="2230078" y="1522292"/>
+            <a:ext cx="7772400" cy="0"/>
+          </a:xfrm>
+          <a:prstGeom prst="line">
+            <a:avLst/>
+          </a:prstGeom>
+          <a:ln w="22225">
+            <a:solidFill>
+              <a:srgbClr val="D9D9D9"/>
+            </a:solidFill>
+          </a:ln>
+        </p:spPr>
+        <p:style>
+          <a:lnRef idx="1">
+            <a:schemeClr val="accent1"/>
+          </a:lnRef>
+          <a:fillRef idx="0">
+            <a:schemeClr val="accent1"/>
+          </a:fillRef>
+          <a:effectRef idx="0">
+            <a:schemeClr val="accent1"/>
+          </a:effectRef>
+          <a:fontRef idx="minor">
+            <a:schemeClr val="tx1"/>
+          </a:fontRef>
+        </p:style>
+      </p:cxnSp>
+      <p:pic>
+        <p:nvPicPr>
+          <p:cNvPr id="10" name="Grafik 9">
+            <a:extLst>
+              <a:ext uri="{FF2B5EF4-FFF2-40B4-BE49-F238E27FC236}">
+                <a16:creationId xmlns:a16="http://schemas.microsoft.com/office/drawing/2014/main" id="{87075D6B-A570-412C-B57D-68EDF1A5F71F}"/>
+              </a:ext>
+            </a:extLst>
+          </p:cNvPr>
+          <p:cNvPicPr>
+            <a:picLocks noChangeAspect="1"/>
+          </p:cNvPicPr>
+          <p:nvPr/>
+        </p:nvPicPr>
+        <p:blipFill>
+          <a:blip r:embed="rId2"/>
+          <a:stretch>
+            <a:fillRect/>
+          </a:stretch>
+        </p:blipFill>
+        <p:spPr>
+          <a:xfrm>
+            <a:off x="331567" y="2596836"/>
+            <a:ext cx="5455917" cy="3657600"/>
+          </a:xfrm>
+          <a:prstGeom prst="rect">
+            <a:avLst/>
+          </a:prstGeom>
+        </p:spPr>
+      </p:pic>
+      <p:cxnSp>
+        <p:nvCxnSpPr>
+          <p:cNvPr id="25" name="Straight Connector 24">
+            <a:extLst>
+              <a:ext uri="{FF2B5EF4-FFF2-40B4-BE49-F238E27FC236}">
+                <a16:creationId xmlns:a16="http://schemas.microsoft.com/office/drawing/2014/main" id="{DB146403-F3D6-484B-B2ED-97F9565D0370}"/>
+              </a:ext>
+              <a:ext uri="{C183D7F6-B498-43B3-948B-1728B52AA6E4}">
+                <adec:decorative xmlns:adec="http://schemas.microsoft.com/office/drawing/2017/decorative" val="1"/>
+              </a:ext>
+            </a:extLst>
+          </p:cNvPr>
+          <p:cNvCxnSpPr>
+            <a:cxnSpLocks noGrp="1" noRot="1" noChangeAspect="1" noMove="1" noResize="1" noEditPoints="1" noAdjustHandles="1" noChangeArrowheads="1" noChangeShapeType="1"/>
+          </p:cNvCxnSpPr>
+          <p:nvPr>
+            <p:extLst>
+              <p:ext uri="{386F3935-93C4-4BCD-93E2-E3B085C9AB24}">
+                <p16:designElem xmlns:p16="http://schemas.microsoft.com/office/powerpoint/2015/main" val="1"/>
+              </p:ext>
+            </p:extLst>
+          </p:nvPr>
+        </p:nvCxnSpPr>
+        <p:spPr>
+          <a:xfrm>
+            <a:off x="6116278" y="2596836"/>
+            <a:ext cx="0" cy="3657600"/>
+          </a:xfrm>
+          <a:prstGeom prst="line">
+            <a:avLst/>
+          </a:prstGeom>
+          <a:ln w="101600" cmpd="dbl">
+            <a:solidFill>
+              <a:srgbClr val="595959"/>
+            </a:solidFill>
+          </a:ln>
+        </p:spPr>
+        <p:style>
+          <a:lnRef idx="1">
+            <a:schemeClr val="accent1"/>
+          </a:lnRef>
+          <a:fillRef idx="0">
+            <a:schemeClr val="accent1"/>
+          </a:fillRef>
+          <a:effectRef idx="0">
+            <a:schemeClr val="accent1"/>
+          </a:effectRef>
+          <a:fontRef idx="minor">
+            <a:schemeClr val="tx1"/>
+          </a:fontRef>
+        </p:style>
+      </p:cxnSp>
+      <p:pic>
+        <p:nvPicPr>
+          <p:cNvPr id="13" name="Grafik 12">
+            <a:extLst>
+              <a:ext uri="{FF2B5EF4-FFF2-40B4-BE49-F238E27FC236}">
+                <a16:creationId xmlns:a16="http://schemas.microsoft.com/office/drawing/2014/main" id="{B619D504-CEC2-40A2-AB28-F9F1CBF026A9}"/>
+              </a:ext>
+            </a:extLst>
+          </p:cNvPr>
+          <p:cNvPicPr>
+            <a:picLocks noChangeAspect="1"/>
+          </p:cNvPicPr>
+          <p:nvPr/>
+        </p:nvPicPr>
+        <p:blipFill>
+          <a:blip r:embed="rId3"/>
+          <a:stretch>
+            <a:fillRect/>
+          </a:stretch>
+        </p:blipFill>
+        <p:spPr>
+          <a:xfrm>
+            <a:off x="6445073" y="2596836"/>
+            <a:ext cx="5455917" cy="3657600"/>
+          </a:xfrm>
+          <a:prstGeom prst="rect">
+            <a:avLst/>
+          </a:prstGeom>
+        </p:spPr>
+      </p:pic>
+    </p:spTree>
+    <p:extLst>
+      <p:ext uri="{BB962C8B-B14F-4D97-AF65-F5344CB8AC3E}">
+        <p14:creationId xmlns:p14="http://schemas.microsoft.com/office/powerpoint/2010/main" val="1212884202"/>
+      </p:ext>
+    </p:extLst>
+  </p:cSld>
+  <p:clrMapOvr>
+    <a:masterClrMapping/>
+  </p:clrMapOvr>
+</p:sld>
+</file>
+
+<file path=ppt/slides/slide6.xml><?xml version="1.0" encoding="utf-8"?>
+<p:sld xmlns:a="http://schemas.openxmlformats.org/drawingml/2006/main" xmlns:r="http://schemas.openxmlformats.org/officeDocument/2006/relationships" xmlns:p="http://schemas.openxmlformats.org/presentationml/2006/main">
+  <p:cSld>
+    <p:bg>
+      <p:bgPr>
+        <a:solidFill>
+          <a:schemeClr val="bg1"/>
+        </a:solidFill>
+        <a:effectLst/>
+      </p:bgPr>
+    </p:bg>
+    <p:spTree>
+      <p:nvGrpSpPr>
+        <p:cNvPr id="1" name=""/>
+        <p:cNvGrpSpPr/>
+        <p:nvPr/>
+      </p:nvGrpSpPr>
+      <p:grpSpPr>
+        <a:xfrm>
+          <a:off x="0" y="0"/>
+          <a:ext cx="0" cy="0"/>
+          <a:chOff x="0" y="0"/>
+          <a:chExt cx="0" cy="0"/>
+        </a:xfrm>
+      </p:grpSpPr>
+      <p:sp>
+        <p:nvSpPr>
+          <p:cNvPr id="15" name="Inhaltsplatzhalter 2">
+            <a:extLst>
+              <a:ext uri="{FF2B5EF4-FFF2-40B4-BE49-F238E27FC236}">
+                <a16:creationId xmlns:a16="http://schemas.microsoft.com/office/drawing/2014/main" id="{24C8E687-C2E8-47F8-8901-2C673DFAB849}"/>
+              </a:ext>
+            </a:extLst>
+          </p:cNvPr>
+          <p:cNvSpPr>
+            <a:spLocks noGrp="1"/>
+          </p:cNvSpPr>
+          <p:nvPr>
+            <p:ph idx="1"/>
+          </p:nvPr>
+        </p:nvSpPr>
+        <p:spPr>
+          <a:xfrm>
+            <a:off x="648931" y="2438401"/>
+            <a:ext cx="3667036" cy="3779520"/>
+          </a:xfrm>
+        </p:spPr>
+        <p:txBody>
+          <a:bodyPr>
+            <a:normAutofit/>
+          </a:bodyPr>
+          <a:lstStyle/>
+          <a:p>
+            <a:pPr marL="0" indent="0">
+              <a:buNone/>
+            </a:pPr>
+            <a:r>
+              <a:rPr lang="de-DE" altLang="zh-CN" sz="1800" dirty="0"/>
+              <a:t>The </a:t>
+            </a:r>
+            <a:r>
+              <a:rPr lang="de-DE" altLang="zh-CN" sz="1800" dirty="0" err="1"/>
+              <a:t>majority</a:t>
+            </a:r>
+            <a:r>
+              <a:rPr lang="de-DE" altLang="zh-CN" sz="1800" dirty="0"/>
+              <a:t> </a:t>
+            </a:r>
+            <a:r>
+              <a:rPr lang="de-DE" altLang="zh-CN" sz="1800" dirty="0" err="1"/>
+              <a:t>coins</a:t>
+            </a:r>
+            <a:r>
+              <a:rPr lang="de-DE" altLang="zh-CN" sz="1800" dirty="0"/>
+              <a:t> </a:t>
+            </a:r>
+            <a:r>
+              <a:rPr lang="de-DE" altLang="zh-CN" sz="1800" dirty="0" err="1"/>
+              <a:t>are</a:t>
+            </a:r>
+            <a:r>
+              <a:rPr lang="de-DE" altLang="zh-CN" sz="1800" dirty="0"/>
+              <a:t> </a:t>
+            </a:r>
+            <a:r>
+              <a:rPr lang="de-DE" altLang="zh-CN" sz="1800" dirty="0" err="1"/>
+              <a:t>highly</a:t>
+            </a:r>
+            <a:r>
+              <a:rPr lang="de-DE" altLang="zh-CN" sz="1800" dirty="0"/>
+              <a:t> </a:t>
+            </a:r>
+            <a:r>
+              <a:rPr lang="de-DE" altLang="zh-CN" sz="1800" dirty="0" err="1"/>
+              <a:t>correlated</a:t>
+            </a:r>
+            <a:r>
+              <a:rPr lang="de-DE" altLang="zh-CN" sz="1800" dirty="0"/>
+              <a:t> </a:t>
+            </a:r>
+            <a:r>
+              <a:rPr lang="de-DE" altLang="zh-CN" sz="1800" dirty="0" err="1"/>
+              <a:t>to</a:t>
+            </a:r>
+            <a:r>
+              <a:rPr lang="de-DE" altLang="zh-CN" sz="1800" dirty="0"/>
+              <a:t> </a:t>
+            </a:r>
+            <a:r>
+              <a:rPr lang="de-DE" altLang="zh-CN" sz="1800" dirty="0" err="1"/>
+              <a:t>each</a:t>
+            </a:r>
+            <a:r>
+              <a:rPr lang="de-DE" altLang="zh-CN" sz="1800" dirty="0"/>
+              <a:t> </a:t>
+            </a:r>
+            <a:r>
+              <a:rPr lang="de-DE" altLang="zh-CN" sz="1800" dirty="0" err="1"/>
+              <a:t>other</a:t>
+            </a:r>
+            <a:r>
+              <a:rPr lang="de-DE" altLang="zh-CN" sz="1800" dirty="0"/>
+              <a:t> </a:t>
+            </a:r>
+            <a:r>
+              <a:rPr lang="de-DE" altLang="zh-CN" sz="1800" dirty="0" err="1"/>
+              <a:t>except</a:t>
+            </a:r>
+            <a:r>
+              <a:rPr lang="de-DE" altLang="zh-CN" sz="1800" dirty="0"/>
+              <a:t> </a:t>
+            </a:r>
+            <a:r>
+              <a:rPr lang="de-DE" altLang="zh-CN" sz="1800" dirty="0" err="1"/>
+              <a:t>Binance</a:t>
+            </a:r>
+            <a:r>
+              <a:rPr lang="de-DE" altLang="zh-CN" sz="1800" dirty="0"/>
+              <a:t> </a:t>
+            </a:r>
+            <a:r>
+              <a:rPr lang="de-DE" altLang="zh-CN" sz="1800" dirty="0" err="1"/>
+              <a:t>Coin</a:t>
+            </a:r>
+            <a:r>
+              <a:rPr lang="de-DE" altLang="zh-CN" sz="1800" dirty="0"/>
+              <a:t> and BSV.</a:t>
+            </a:r>
+          </a:p>
+          <a:p>
+            <a:pPr marL="0" indent="0">
+              <a:buNone/>
+            </a:pPr>
+            <a:endParaRPr lang="de-DE" altLang="zh-CN" sz="1800" dirty="0"/>
+          </a:p>
+          <a:p>
+            <a:pPr marL="0" indent="0">
+              <a:buNone/>
+            </a:pPr>
+            <a:r>
+              <a:rPr lang="de-DE" altLang="zh-CN" sz="1800" dirty="0" err="1"/>
+              <a:t>Normally</a:t>
+            </a:r>
+            <a:r>
+              <a:rPr lang="de-DE" altLang="zh-CN" sz="1800" dirty="0"/>
+              <a:t> </a:t>
+            </a:r>
+            <a:r>
+              <a:rPr lang="de-DE" altLang="zh-CN" sz="1800" dirty="0" err="1"/>
+              <a:t>we</a:t>
+            </a:r>
+            <a:r>
+              <a:rPr lang="de-DE" altLang="zh-CN" sz="1800" dirty="0"/>
+              <a:t> </a:t>
+            </a:r>
+            <a:r>
+              <a:rPr lang="de-DE" altLang="zh-CN" sz="1800" dirty="0" err="1"/>
+              <a:t>should</a:t>
+            </a:r>
+            <a:r>
+              <a:rPr lang="de-DE" altLang="zh-CN" sz="1800" dirty="0"/>
+              <a:t> </a:t>
+            </a:r>
+            <a:r>
+              <a:rPr lang="de-DE" altLang="zh-CN" sz="1800" dirty="0" err="1"/>
+              <a:t>built</a:t>
+            </a:r>
+            <a:r>
+              <a:rPr lang="de-DE" altLang="zh-CN" sz="1800" dirty="0"/>
+              <a:t> </a:t>
+            </a:r>
+            <a:r>
+              <a:rPr lang="de-DE" altLang="zh-CN" sz="1800" dirty="0" err="1"/>
+              <a:t>the</a:t>
+            </a:r>
+            <a:r>
+              <a:rPr lang="de-DE" altLang="zh-CN" sz="1800" dirty="0"/>
+              <a:t> </a:t>
+            </a:r>
+            <a:r>
+              <a:rPr lang="de-DE" altLang="zh-CN" sz="1800" dirty="0" err="1"/>
+              <a:t>portfolio</a:t>
+            </a:r>
+            <a:r>
+              <a:rPr lang="de-DE" altLang="zh-CN" sz="1800" dirty="0"/>
+              <a:t> </a:t>
+            </a:r>
+            <a:r>
+              <a:rPr lang="de-DE" altLang="zh-CN" sz="1800" dirty="0" err="1"/>
+              <a:t>with</a:t>
+            </a:r>
+            <a:r>
+              <a:rPr lang="de-DE" altLang="zh-CN" sz="1800" dirty="0"/>
+              <a:t> </a:t>
+            </a:r>
+            <a:r>
+              <a:rPr lang="de-DE" altLang="zh-CN" sz="1800" dirty="0" err="1"/>
+              <a:t>lower</a:t>
+            </a:r>
+            <a:r>
+              <a:rPr lang="de-DE" altLang="zh-CN" sz="1800" dirty="0"/>
+              <a:t> </a:t>
+            </a:r>
+            <a:r>
+              <a:rPr lang="de-DE" altLang="zh-CN" sz="1800" dirty="0" err="1"/>
+              <a:t>correlated</a:t>
+            </a:r>
+            <a:r>
+              <a:rPr lang="de-DE" altLang="zh-CN" sz="1800" dirty="0"/>
+              <a:t> </a:t>
+            </a:r>
+            <a:r>
+              <a:rPr lang="de-DE" altLang="zh-CN" sz="1800" dirty="0" err="1"/>
+              <a:t>assets</a:t>
+            </a:r>
+            <a:r>
+              <a:rPr lang="de-DE" altLang="zh-CN" sz="1800" dirty="0"/>
+              <a:t>.</a:t>
+            </a:r>
+          </a:p>
+          <a:p>
+            <a:pPr marL="0" indent="0">
+              <a:buNone/>
+            </a:pPr>
+            <a:endParaRPr lang="zh-CN" altLang="en-US" sz="1800" dirty="0"/>
+          </a:p>
+        </p:txBody>
+      </p:sp>
+      <p:sp>
+        <p:nvSpPr>
+          <p:cNvPr id="20" name="Rectangle 19">
+            <a:extLst>
+              <a:ext uri="{FF2B5EF4-FFF2-40B4-BE49-F238E27FC236}">
+                <a16:creationId xmlns:a16="http://schemas.microsoft.com/office/drawing/2014/main" id="{F2B38F72-8FC4-4001-8C67-FA6B86DEC767}"/>
+              </a:ext>
+              <a:ext uri="{C183D7F6-B498-43B3-948B-1728B52AA6E4}">
+                <adec:decorative xmlns:adec="http://schemas.microsoft.com/office/drawing/2017/decorative" val="1"/>
+              </a:ext>
+            </a:extLst>
+          </p:cNvPr>
+          <p:cNvSpPr>
+            <a:spLocks noGrp="1" noRot="1" noChangeAspect="1" noMove="1" noResize="1" noEditPoints="1" noAdjustHandles="1" noChangeArrowheads="1" noChangeShapeType="1" noTextEdit="1"/>
+          </p:cNvSpPr>
+          <p:nvPr>
+            <p:extLst>
+              <p:ext uri="{386F3935-93C4-4BCD-93E2-E3B085C9AB24}">
+                <p16:designElem xmlns:p16="http://schemas.microsoft.com/office/powerpoint/2015/main" val="1"/>
+              </p:ext>
+            </p:extLst>
+          </p:nvPr>
+        </p:nvSpPr>
+        <p:spPr>
+          <a:xfrm>
+            <a:off x="4636008" y="2"/>
+            <a:ext cx="7555992" cy="6857998"/>
+          </a:xfrm>
+          <a:prstGeom prst="rect">
+            <a:avLst/>
+          </a:prstGeom>
+          <a:solidFill>
+            <a:schemeClr val="tx1"/>
+          </a:solidFill>
+          <a:ln>
+            <a:noFill/>
+          </a:ln>
+        </p:spPr>
+        <p:style>
+          <a:lnRef idx="2">
+            <a:schemeClr val="accent1">
+              <a:shade val="50000"/>
+            </a:schemeClr>
+          </a:lnRef>
+          <a:fillRef idx="1">
+            <a:schemeClr val="accent1"/>
+          </a:fillRef>
+          <a:effectRef idx="0">
+            <a:schemeClr val="accent1"/>
+          </a:effectRef>
+          <a:fontRef idx="minor">
+            <a:schemeClr val="lt1"/>
+          </a:fontRef>
+        </p:style>
+        <p:txBody>
+          <a:bodyPr rtlCol="0" anchor="ctr"/>
+          <a:lstStyle/>
+          <a:p>
+            <a:pPr algn="ctr"/>
+            <a:endParaRPr lang="en-US"/>
+          </a:p>
+        </p:txBody>
+      </p:sp>
+      <p:pic>
+        <p:nvPicPr>
+          <p:cNvPr id="6" name="Grafik 5">
+            <a:extLst>
+              <a:ext uri="{FF2B5EF4-FFF2-40B4-BE49-F238E27FC236}">
+                <a16:creationId xmlns:a16="http://schemas.microsoft.com/office/drawing/2014/main" id="{1B859055-A369-43CD-938F-C36B6E03FB26}"/>
+              </a:ext>
+            </a:extLst>
+          </p:cNvPr>
+          <p:cNvPicPr>
+            <a:picLocks noChangeAspect="1"/>
+          </p:cNvPicPr>
+          <p:nvPr/>
+        </p:nvPicPr>
+        <p:blipFill rotWithShape="1">
+          <a:blip r:embed="rId2">
+            <a:extLst>
+              <a:ext uri="{28A0092B-C50C-407E-A947-70E740481C1C}">
+                <a14:useLocalDpi xmlns:a14="http://schemas.microsoft.com/office/drawing/2010/main" val="0"/>
+              </a:ext>
+            </a:extLst>
+          </a:blip>
+          <a:srcRect t="11128" r="2" b="2"/>
+          <a:stretch/>
+        </p:blipFill>
+        <p:spPr>
+          <a:xfrm>
+            <a:off x="4784035" y="0"/>
+            <a:ext cx="7407965" cy="6758609"/>
+          </a:xfrm>
+          <a:prstGeom prst="rect">
+            <a:avLst/>
+          </a:prstGeom>
+          <a:effectLst/>
+        </p:spPr>
+      </p:pic>
+    </p:spTree>
+    <p:extLst>
+      <p:ext uri="{BB962C8B-B14F-4D97-AF65-F5344CB8AC3E}">
+        <p14:creationId xmlns:p14="http://schemas.microsoft.com/office/powerpoint/2010/main" val="2652313975"/>
+      </p:ext>
+    </p:extLst>
+  </p:cSld>
+  <p:clrMapOvr>
+    <a:overrideClrMapping bg1="dk1" tx1="lt1" bg2="dk2" tx2="lt2" accent1="accent1" accent2="accent2" accent3="accent3" accent4="accent4" accent5="accent5" accent6="accent6" hlink="hlink" folHlink="folHlink"/>
+  </p:clrMapOvr>
+</p:sld>
+</file>
+
+<file path=ppt/slides/slide7.xml><?xml version="1.0" encoding="utf-8"?>
+<p:sld xmlns:a="http://schemas.openxmlformats.org/drawingml/2006/main" xmlns:r="http://schemas.openxmlformats.org/officeDocument/2006/relationships" xmlns:p="http://schemas.openxmlformats.org/presentationml/2006/main">
+  <p:cSld>
+    <p:bg>
+      <p:bgPr>
+        <a:solidFill>
+          <a:schemeClr val="bg1"/>
+        </a:solidFill>
+        <a:effectLst/>
+      </p:bgPr>
+    </p:bg>
+    <p:spTree>
+      <p:nvGrpSpPr>
+        <p:cNvPr id="1" name=""/>
+        <p:cNvGrpSpPr/>
+        <p:nvPr/>
+      </p:nvGrpSpPr>
+      <p:grpSpPr>
+        <a:xfrm>
+          <a:off x="0" y="0"/>
+          <a:ext cx="0" cy="0"/>
+          <a:chOff x="0" y="0"/>
+          <a:chExt cx="0" cy="0"/>
+        </a:xfrm>
+      </p:grpSpPr>
+      <p:sp>
+        <p:nvSpPr>
+          <p:cNvPr id="20" name="Rectangle 11">
+            <a:extLst>
+              <a:ext uri="{FF2B5EF4-FFF2-40B4-BE49-F238E27FC236}">
+                <a16:creationId xmlns:a16="http://schemas.microsoft.com/office/drawing/2014/main" id="{A4AC5506-6312-4701-8D3C-40187889A947}"/>
+              </a:ext>
+              <a:ext uri="{C183D7F6-B498-43B3-948B-1728B52AA6E4}">
+                <adec:decorative xmlns:adec="http://schemas.microsoft.com/office/drawing/2017/decorative" val="1"/>
+              </a:ext>
+            </a:extLst>
+          </p:cNvPr>
+          <p:cNvSpPr>
+            <a:spLocks noGrp="1" noRot="1" noChangeAspect="1" noMove="1" noResize="1" noEditPoints="1" noAdjustHandles="1" noChangeArrowheads="1" noChangeShapeType="1" noTextEdit="1"/>
+          </p:cNvSpPr>
+          <p:nvPr>
+            <p:extLst>
+              <p:ext uri="{386F3935-93C4-4BCD-93E2-E3B085C9AB24}">
+                <p16:designElem xmlns:p16="http://schemas.microsoft.com/office/powerpoint/2015/main" val="1"/>
+              </p:ext>
+            </p:extLst>
+          </p:nvPr>
+        </p:nvSpPr>
+        <p:spPr>
+          <a:xfrm>
+            <a:off x="0" y="651752"/>
+            <a:ext cx="12192000" cy="736551"/>
+          </a:xfrm>
+          <a:prstGeom prst="rect">
+            <a:avLst/>
+          </a:prstGeom>
+          <a:solidFill>
+            <a:schemeClr val="tx1"/>
+          </a:solidFill>
+          <a:ln>
+            <a:noFill/>
+          </a:ln>
+        </p:spPr>
+        <p:style>
+          <a:lnRef idx="2">
+            <a:schemeClr val="accent1">
+              <a:shade val="50000"/>
+            </a:schemeClr>
+          </a:lnRef>
+          <a:fillRef idx="1">
+            <a:schemeClr val="accent1"/>
+          </a:fillRef>
+          <a:effectRef idx="0">
+            <a:schemeClr val="accent1"/>
+          </a:effectRef>
+          <a:fontRef idx="minor">
+            <a:schemeClr val="lt1"/>
+          </a:fontRef>
+        </p:style>
+        <p:txBody>
+          <a:bodyPr rtlCol="0" anchor="ctr"/>
+          <a:lstStyle/>
+          <a:p>
+            <a:pPr algn="ctr"/>
+            <a:endParaRPr lang="en-US"/>
+          </a:p>
+        </p:txBody>
+      </p:sp>
+      <p:sp>
+        <p:nvSpPr>
+          <p:cNvPr id="2" name="Titel 1">
+            <a:extLst>
+              <a:ext uri="{FF2B5EF4-FFF2-40B4-BE49-F238E27FC236}">
+                <a16:creationId xmlns:a16="http://schemas.microsoft.com/office/drawing/2014/main" id="{9113B33B-503E-4E9E-A9BF-47B7ED1DEBD5}"/>
+              </a:ext>
+            </a:extLst>
+          </p:cNvPr>
+          <p:cNvSpPr>
+            <a:spLocks noGrp="1"/>
+          </p:cNvSpPr>
+          <p:nvPr>
+            <p:ph type="title"/>
+          </p:nvPr>
+        </p:nvSpPr>
+        <p:spPr>
+          <a:xfrm>
+            <a:off x="337608" y="635687"/>
+            <a:ext cx="11210925" cy="744836"/>
+          </a:xfrm>
+        </p:spPr>
+        <p:txBody>
+          <a:bodyPr vert="horz" lIns="91440" tIns="45720" rIns="91440" bIns="45720" rtlCol="0" anchor="ctr">
+            <a:normAutofit fontScale="90000"/>
+          </a:bodyPr>
+          <a:lstStyle/>
+          <a:p>
+            <a:pPr algn="ctr"/>
+            <a:r>
+              <a:rPr lang="en-US" altLang="zh-CN" sz="3200" kern="1200" dirty="0">
+                <a:solidFill>
+                  <a:schemeClr val="bg1"/>
+                </a:solidFill>
+                <a:latin typeface="+mj-lt"/>
+                <a:ea typeface="+mj-ea"/>
+                <a:cs typeface="+mj-cs"/>
+              </a:rPr>
+              <a:t>Simulation results : It ran 10.000 times and the results stored in an a </a:t>
+            </a:r>
+            <a:r>
+              <a:rPr lang="en-US" altLang="zh-CN" sz="3200" kern="1200" dirty="0" err="1">
+                <a:solidFill>
+                  <a:schemeClr val="bg1"/>
+                </a:solidFill>
+                <a:latin typeface="+mj-lt"/>
+                <a:ea typeface="+mj-ea"/>
+                <a:cs typeface="+mj-cs"/>
+              </a:rPr>
+              <a:t>dataframe</a:t>
+            </a:r>
+            <a:endParaRPr lang="en-US" altLang="zh-CN" sz="3200" kern="1200" dirty="0">
+              <a:solidFill>
+                <a:schemeClr val="bg1"/>
+              </a:solidFill>
+              <a:latin typeface="+mj-lt"/>
+              <a:ea typeface="+mj-ea"/>
+              <a:cs typeface="+mj-cs"/>
+            </a:endParaRPr>
+          </a:p>
+        </p:txBody>
+      </p:sp>
+      <p:pic>
+        <p:nvPicPr>
+          <p:cNvPr id="7" name="Grafik 6">
+            <a:extLst>
+              <a:ext uri="{FF2B5EF4-FFF2-40B4-BE49-F238E27FC236}">
+                <a16:creationId xmlns:a16="http://schemas.microsoft.com/office/drawing/2014/main" id="{718051A2-F5AC-4FF5-9127-6D537FCF64DF}"/>
+              </a:ext>
+            </a:extLst>
+          </p:cNvPr>
+          <p:cNvPicPr>
+            <a:picLocks noChangeAspect="1"/>
+          </p:cNvPicPr>
+          <p:nvPr/>
+        </p:nvPicPr>
+        <p:blipFill>
+          <a:blip r:embed="rId2"/>
+          <a:stretch>
+            <a:fillRect/>
+          </a:stretch>
+        </p:blipFill>
+        <p:spPr>
+          <a:xfrm>
+            <a:off x="643467" y="1841258"/>
+            <a:ext cx="10905066" cy="4062136"/>
+          </a:xfrm>
+          <a:prstGeom prst="rect">
+            <a:avLst/>
+          </a:prstGeom>
+        </p:spPr>
+      </p:pic>
+    </p:spTree>
+    <p:extLst>
+      <p:ext uri="{BB962C8B-B14F-4D97-AF65-F5344CB8AC3E}">
+        <p14:creationId xmlns:p14="http://schemas.microsoft.com/office/powerpoint/2010/main" val="1955607486"/>
+      </p:ext>
+    </p:extLst>
+  </p:cSld>
+  <p:clrMapOvr>
+    <a:masterClrMapping/>
+  </p:clrMapOvr>
+</p:sld>
+</file>
+
+<file path=ppt/slides/slide8.xml><?xml version="1.0" encoding="utf-8"?>
+<p:sld xmlns:a="http://schemas.openxmlformats.org/drawingml/2006/main" xmlns:r="http://schemas.openxmlformats.org/officeDocument/2006/relationships" xmlns:p="http://schemas.openxmlformats.org/presentationml/2006/main">
+  <p:cSld>
+    <p:bg>
+      <p:bgPr>
+        <a:solidFill>
+          <a:schemeClr val="bg1"/>
+        </a:solidFill>
+        <a:effectLst/>
+      </p:bgPr>
+    </p:bg>
+    <p:spTree>
+      <p:nvGrpSpPr>
+        <p:cNvPr id="1" name=""/>
+        <p:cNvGrpSpPr/>
+        <p:nvPr/>
+      </p:nvGrpSpPr>
+      <p:grpSpPr>
+        <a:xfrm>
+          <a:off x="0" y="0"/>
+          <a:ext cx="0" cy="0"/>
+          <a:chOff x="0" y="0"/>
+          <a:chExt cx="0" cy="0"/>
+        </a:xfrm>
+      </p:grpSpPr>
+      <p:sp>
+        <p:nvSpPr>
+          <p:cNvPr id="2" name="Titel 1">
+            <a:extLst>
+              <a:ext uri="{FF2B5EF4-FFF2-40B4-BE49-F238E27FC236}">
+                <a16:creationId xmlns:a16="http://schemas.microsoft.com/office/drawing/2014/main" id="{FEE40733-378C-4E91-B6DF-91694D00EF86}"/>
+              </a:ext>
+            </a:extLst>
+          </p:cNvPr>
+          <p:cNvSpPr>
+            <a:spLocks noGrp="1"/>
+          </p:cNvSpPr>
+          <p:nvPr>
+            <p:ph type="title"/>
+          </p:nvPr>
+        </p:nvSpPr>
+        <p:spPr>
+          <a:xfrm>
+            <a:off x="648929" y="629266"/>
+            <a:ext cx="3667039" cy="2409356"/>
+          </a:xfrm>
+        </p:spPr>
+        <p:txBody>
+          <a:bodyPr>
+            <a:normAutofit fontScale="90000"/>
+          </a:bodyPr>
+          <a:lstStyle/>
+          <a:p>
+            <a:r>
+              <a:rPr lang="de-DE" altLang="zh-CN" sz="3600" dirty="0" err="1"/>
+              <a:t>Results</a:t>
+            </a:r>
+            <a:r>
+              <a:rPr lang="de-DE" altLang="zh-CN" sz="3600" dirty="0"/>
+              <a:t>:</a:t>
+            </a:r>
+            <a:br>
+              <a:rPr lang="de-DE" altLang="zh-CN" sz="3600" dirty="0"/>
+            </a:br>
+            <a:r>
+              <a:rPr lang="de-DE" altLang="zh-CN" sz="3600" dirty="0" err="1"/>
+              <a:t>highest</a:t>
+            </a:r>
+            <a:r>
+              <a:rPr lang="de-DE" altLang="zh-CN" sz="3600" dirty="0"/>
+              <a:t> </a:t>
+            </a:r>
+            <a:r>
+              <a:rPr lang="de-DE" altLang="zh-CN" sz="3600" dirty="0" err="1"/>
+              <a:t>return</a:t>
+            </a:r>
+            <a:br>
+              <a:rPr lang="de-DE" altLang="zh-CN" sz="3600" dirty="0"/>
+            </a:br>
+            <a:r>
+              <a:rPr lang="de-DE" altLang="zh-CN" sz="3600" dirty="0" err="1"/>
+              <a:t>highest</a:t>
+            </a:r>
+            <a:r>
+              <a:rPr lang="de-DE" altLang="zh-CN" sz="3600" dirty="0"/>
+              <a:t> Sharpe </a:t>
+            </a:r>
+            <a:r>
+              <a:rPr lang="de-DE" altLang="zh-CN" sz="3600" dirty="0" err="1"/>
+              <a:t>ratio</a:t>
+            </a:r>
+            <a:br>
+              <a:rPr lang="de-DE" altLang="zh-CN" sz="3600" dirty="0"/>
+            </a:br>
+            <a:r>
+              <a:rPr lang="de-DE" altLang="zh-CN" sz="3600" dirty="0" err="1"/>
+              <a:t>lowest</a:t>
+            </a:r>
+            <a:r>
+              <a:rPr lang="de-DE" altLang="zh-CN" sz="3600" dirty="0"/>
+              <a:t> </a:t>
+            </a:r>
+            <a:r>
+              <a:rPr lang="de-DE" altLang="zh-CN" sz="3600" dirty="0" err="1"/>
+              <a:t>risk</a:t>
+            </a:r>
+            <a:r>
+              <a:rPr lang="de-DE" altLang="zh-CN" sz="3600" dirty="0"/>
+              <a:t> / </a:t>
+            </a:r>
+            <a:r>
+              <a:rPr lang="de-DE" altLang="zh-CN" sz="3600" dirty="0" err="1"/>
+              <a:t>volatility</a:t>
+            </a:r>
+            <a:endParaRPr lang="zh-CN" altLang="en-US" sz="3600" dirty="0"/>
+          </a:p>
+        </p:txBody>
+      </p:sp>
+      <p:sp>
+        <p:nvSpPr>
+          <p:cNvPr id="12" name="Rectangle 11">
+            <a:extLst>
+              <a:ext uri="{FF2B5EF4-FFF2-40B4-BE49-F238E27FC236}">
+                <a16:creationId xmlns:a16="http://schemas.microsoft.com/office/drawing/2014/main" id="{F2B38F72-8FC4-4001-8C67-FA6B86DEC767}"/>
+              </a:ext>
+              <a:ext uri="{C183D7F6-B498-43B3-948B-1728B52AA6E4}">
+                <adec:decorative xmlns:adec="http://schemas.microsoft.com/office/drawing/2017/decorative" val="1"/>
+              </a:ext>
+            </a:extLst>
+          </p:cNvPr>
+          <p:cNvSpPr>
+            <a:spLocks noGrp="1" noRot="1" noChangeAspect="1" noMove="1" noResize="1" noEditPoints="1" noAdjustHandles="1" noChangeArrowheads="1" noChangeShapeType="1" noTextEdit="1"/>
+          </p:cNvSpPr>
+          <p:nvPr>
+            <p:extLst>
+              <p:ext uri="{386F3935-93C4-4BCD-93E2-E3B085C9AB24}">
+                <p16:designElem xmlns:p16="http://schemas.microsoft.com/office/powerpoint/2015/main" val="1"/>
+              </p:ext>
+            </p:extLst>
+          </p:nvPr>
+        </p:nvSpPr>
+        <p:spPr>
+          <a:xfrm>
+            <a:off x="4636008" y="2"/>
+            <a:ext cx="7555992" cy="6857998"/>
+          </a:xfrm>
+          <a:prstGeom prst="rect">
+            <a:avLst/>
+          </a:prstGeom>
+          <a:solidFill>
+            <a:schemeClr val="tx1"/>
+          </a:solidFill>
+          <a:ln>
+            <a:noFill/>
+          </a:ln>
+        </p:spPr>
+        <p:style>
+          <a:lnRef idx="2">
+            <a:schemeClr val="accent1">
+              <a:shade val="50000"/>
+            </a:schemeClr>
+          </a:lnRef>
+          <a:fillRef idx="1">
+            <a:schemeClr val="accent1"/>
+          </a:fillRef>
+          <a:effectRef idx="0">
+            <a:schemeClr val="accent1"/>
+          </a:effectRef>
+          <a:fontRef idx="minor">
+            <a:schemeClr val="lt1"/>
+          </a:fontRef>
+        </p:style>
+        <p:txBody>
+          <a:bodyPr rtlCol="0" anchor="ctr"/>
+          <a:lstStyle/>
+          <a:p>
+            <a:pPr algn="ctr"/>
+            <a:endParaRPr lang="en-US"/>
+          </a:p>
+        </p:txBody>
+      </p:sp>
+      <p:pic>
+        <p:nvPicPr>
+          <p:cNvPr id="10" name="Grafik 9">
+            <a:extLst>
+              <a:ext uri="{FF2B5EF4-FFF2-40B4-BE49-F238E27FC236}">
+                <a16:creationId xmlns:a16="http://schemas.microsoft.com/office/drawing/2014/main" id="{BC1CFA76-9451-400F-8FC3-F6B2684D582A}"/>
+              </a:ext>
+            </a:extLst>
+          </p:cNvPr>
+          <p:cNvPicPr>
+            <a:picLocks noChangeAspect="1"/>
+          </p:cNvPicPr>
+          <p:nvPr/>
+        </p:nvPicPr>
+        <p:blipFill>
+          <a:blip r:embed="rId2"/>
+          <a:stretch>
+            <a:fillRect/>
+          </a:stretch>
+        </p:blipFill>
+        <p:spPr>
+          <a:xfrm>
+            <a:off x="4636006" y="0"/>
+            <a:ext cx="7555993" cy="6858000"/>
+          </a:xfrm>
+          <a:prstGeom prst="rect">
+            <a:avLst/>
+          </a:prstGeom>
+        </p:spPr>
+      </p:pic>
+    </p:spTree>
+    <p:extLst>
+      <p:ext uri="{BB962C8B-B14F-4D97-AF65-F5344CB8AC3E}">
+        <p14:creationId xmlns:p14="http://schemas.microsoft.com/office/powerpoint/2010/main" val="481383726"/>
+      </p:ext>
+    </p:extLst>
+  </p:cSld>
+  <p:clrMapOvr>
+    <a:overrideClrMapping bg1="dk1" tx1="lt1" bg2="dk2" tx2="lt2" accent1="accent1" accent2="accent2" accent3="accent3" accent4="accent4" accent5="accent5" accent6="accent6" hlink="hlink" folHlink="folHlink"/>
+  </p:clrMapOvr>
+</p:sld>
+</file>
+
+<file path=ppt/slides/slide9.xml><?xml version="1.0" encoding="utf-8"?>
+<p:sld xmlns:a="http://schemas.openxmlformats.org/drawingml/2006/main" xmlns:r="http://schemas.openxmlformats.org/officeDocument/2006/relationships" xmlns:p="http://schemas.openxmlformats.org/presentationml/2006/main">
+  <p:cSld>
+    <p:bg>
+      <p:bgPr>
+        <a:solidFill>
+          <a:schemeClr val="bg1"/>
+        </a:solidFill>
+        <a:effectLst/>
+      </p:bgPr>
+    </p:bg>
+    <p:spTree>
+      <p:nvGrpSpPr>
+        <p:cNvPr id="1" name=""/>
+        <p:cNvGrpSpPr/>
+        <p:nvPr/>
+      </p:nvGrpSpPr>
+      <p:grpSpPr>
+        <a:xfrm>
+          <a:off x="0" y="0"/>
+          <a:ext cx="0" cy="0"/>
+          <a:chOff x="0" y="0"/>
+          <a:chExt cx="0" cy="0"/>
+        </a:xfrm>
+      </p:grpSpPr>
+      <p:sp>
+        <p:nvSpPr>
+          <p:cNvPr id="32" name="Rectangle 31">
+            <a:extLst>
+              <a:ext uri="{FF2B5EF4-FFF2-40B4-BE49-F238E27FC236}">
+                <a16:creationId xmlns:a16="http://schemas.microsoft.com/office/drawing/2014/main" id="{A4AC5506-6312-4701-8D3C-40187889A947}"/>
+              </a:ext>
+              <a:ext uri="{C183D7F6-B498-43B3-948B-1728B52AA6E4}">
+                <adec:decorative xmlns:adec="http://schemas.microsoft.com/office/drawing/2017/decorative" val="1"/>
+              </a:ext>
+            </a:extLst>
+          </p:cNvPr>
+          <p:cNvSpPr>
+            <a:spLocks noGrp="1" noRot="1" noChangeAspect="1" noMove="1" noResize="1" noEditPoints="1" noAdjustHandles="1" noChangeArrowheads="1" noChangeShapeType="1" noTextEdit="1"/>
+          </p:cNvSpPr>
+          <p:nvPr>
+            <p:extLst>
+              <p:ext uri="{386F3935-93C4-4BCD-93E2-E3B085C9AB24}">
+                <p16:designElem xmlns:p16="http://schemas.microsoft.com/office/powerpoint/2015/main" val="1"/>
+              </p:ext>
+            </p:extLst>
+          </p:nvPr>
+        </p:nvSpPr>
+        <p:spPr>
+          <a:xfrm>
+            <a:off x="0" y="651752"/>
+            <a:ext cx="12192000" cy="736551"/>
+          </a:xfrm>
+          <a:prstGeom prst="rect">
+            <a:avLst/>
+          </a:prstGeom>
+          <a:solidFill>
+            <a:schemeClr val="tx1"/>
+          </a:solidFill>
+          <a:ln>
+            <a:noFill/>
+          </a:ln>
+        </p:spPr>
+        <p:style>
+          <a:lnRef idx="2">
+            <a:schemeClr val="accent1">
+              <a:shade val="50000"/>
+            </a:schemeClr>
+          </a:lnRef>
+          <a:fillRef idx="1">
+            <a:schemeClr val="accent1"/>
+          </a:fillRef>
+          <a:effectRef idx="0">
+            <a:schemeClr val="accent1"/>
+          </a:effectRef>
+          <a:fontRef idx="minor">
+            <a:schemeClr val="lt1"/>
+          </a:fontRef>
+        </p:style>
+        <p:txBody>
+          <a:bodyPr rtlCol="0" anchor="ctr"/>
+          <a:lstStyle/>
+          <a:p>
+            <a:pPr algn="ctr"/>
+            <a:endParaRPr lang="en-US"/>
+          </a:p>
+        </p:txBody>
+      </p:sp>
+      <p:pic>
+        <p:nvPicPr>
+          <p:cNvPr id="9" name="Grafik 8">
+            <a:extLst>
+              <a:ext uri="{FF2B5EF4-FFF2-40B4-BE49-F238E27FC236}">
+                <a16:creationId xmlns:a16="http://schemas.microsoft.com/office/drawing/2014/main" id="{A7AD5915-C340-47EE-821B-8BE1509819DD}"/>
+              </a:ext>
+            </a:extLst>
+          </p:cNvPr>
+          <p:cNvPicPr>
+            <a:picLocks noChangeAspect="1"/>
+          </p:cNvPicPr>
+          <p:nvPr/>
+        </p:nvPicPr>
+        <p:blipFill>
+          <a:blip r:embed="rId2">
+            <a:extLst>
+              <a:ext uri="{28A0092B-C50C-407E-A947-70E740481C1C}">
+                <a14:useLocalDpi xmlns:a14="http://schemas.microsoft.com/office/drawing/2010/main" val="0"/>
+              </a:ext>
+            </a:extLst>
+          </a:blip>
+          <a:stretch>
+            <a:fillRect/>
+          </a:stretch>
+        </p:blipFill>
+        <p:spPr>
+          <a:xfrm>
+            <a:off x="556532" y="1388303"/>
+            <a:ext cx="6041216" cy="5469697"/>
+          </a:xfrm>
+          <a:prstGeom prst="rect">
+            <a:avLst/>
+          </a:prstGeom>
+        </p:spPr>
+      </p:pic>
+      <p:pic>
+        <p:nvPicPr>
+          <p:cNvPr id="7" name="Grafik 6">
+            <a:extLst>
+              <a:ext uri="{FF2B5EF4-FFF2-40B4-BE49-F238E27FC236}">
+                <a16:creationId xmlns:a16="http://schemas.microsoft.com/office/drawing/2014/main" id="{B84D4266-9CEE-4BA7-BD56-CB2C6B368E17}"/>
+              </a:ext>
+            </a:extLst>
+          </p:cNvPr>
+          <p:cNvPicPr>
+            <a:picLocks noChangeAspect="1"/>
+          </p:cNvPicPr>
+          <p:nvPr/>
+        </p:nvPicPr>
+        <p:blipFill rotWithShape="1">
+          <a:blip r:embed="rId3"/>
+          <a:srcRect r="1" b="809"/>
+          <a:stretch/>
+        </p:blipFill>
+        <p:spPr>
+          <a:xfrm>
+            <a:off x="6597748" y="1968913"/>
+            <a:ext cx="5273284" cy="4308475"/>
+          </a:xfrm>
+          <a:prstGeom prst="rect">
+            <a:avLst/>
+          </a:prstGeom>
+        </p:spPr>
+      </p:pic>
+      <p:sp>
+        <p:nvSpPr>
+          <p:cNvPr id="2" name="Titel 1">
+            <a:extLst>
+              <a:ext uri="{FF2B5EF4-FFF2-40B4-BE49-F238E27FC236}">
+                <a16:creationId xmlns:a16="http://schemas.microsoft.com/office/drawing/2014/main" id="{07668FD4-207E-43D4-84CC-3699E5369BE8}"/>
+              </a:ext>
+            </a:extLst>
+          </p:cNvPr>
+          <p:cNvSpPr>
+            <a:spLocks noGrp="1"/>
+          </p:cNvSpPr>
+          <p:nvPr>
+            <p:ph type="title"/>
+          </p:nvPr>
+        </p:nvSpPr>
+        <p:spPr>
+          <a:xfrm>
+            <a:off x="556532" y="643467"/>
+            <a:ext cx="11210925" cy="744836"/>
+          </a:xfrm>
+        </p:spPr>
+        <p:txBody>
+          <a:bodyPr vert="horz" lIns="91440" tIns="45720" rIns="91440" bIns="45720" rtlCol="0" anchor="ctr">
+            <a:normAutofit/>
+          </a:bodyPr>
+          <a:lstStyle/>
+          <a:p>
+            <a:pPr algn="ctr"/>
+            <a:r>
+              <a:rPr lang="en-US" altLang="zh-CN" sz="3200" kern="1200">
+                <a:solidFill>
+                  <a:schemeClr val="bg1"/>
+                </a:solidFill>
+                <a:latin typeface="+mj-lt"/>
+                <a:ea typeface="+mj-ea"/>
+                <a:cs typeface="+mj-cs"/>
+              </a:rPr>
+              <a:t>Plotting results</a:t>
+            </a:r>
+          </a:p>
+        </p:txBody>
+      </p:sp>
+    </p:spTree>
+    <p:extLst>
+      <p:ext uri="{BB962C8B-B14F-4D97-AF65-F5344CB8AC3E}">
+        <p14:creationId xmlns:p14="http://schemas.microsoft.com/office/powerpoint/2010/main" val="877378179"/>
+      </p:ext>
+    </p:extLst>
+  </p:cSld>
+  <p:clrMapOvr>
+    <a:masterClrMapping/>
   </p:clrMapOvr>
 </p:sld>
 </file>

</xml_diff>

<commit_message>
final update on the ppt
</commit_message>
<xml_diff>
--- a/Final Project_portfolio optimisation.pptx
+++ b/Final Project_portfolio optimisation.pptx
@@ -272,7 +272,7 @@
           <a:p>
             <a:fld id="{60D1E923-7CB1-4592-99E2-DF465806760B}" type="datetimeFigureOut">
               <a:rPr lang="zh-CN" altLang="en-US" smtClean="0"/>
-              <a:t>2021/2/20</a:t>
+              <a:t>2021/2/21</a:t>
             </a:fld>
             <a:endParaRPr lang="zh-CN" altLang="en-US"/>
           </a:p>
@@ -472,7 +472,7 @@
           <a:p>
             <a:fld id="{60D1E923-7CB1-4592-99E2-DF465806760B}" type="datetimeFigureOut">
               <a:rPr lang="zh-CN" altLang="en-US" smtClean="0"/>
-              <a:t>2021/2/20</a:t>
+              <a:t>2021/2/21</a:t>
             </a:fld>
             <a:endParaRPr lang="zh-CN" altLang="en-US"/>
           </a:p>
@@ -682,7 +682,7 @@
           <a:p>
             <a:fld id="{60D1E923-7CB1-4592-99E2-DF465806760B}" type="datetimeFigureOut">
               <a:rPr lang="zh-CN" altLang="en-US" smtClean="0"/>
-              <a:t>2021/2/20</a:t>
+              <a:t>2021/2/21</a:t>
             </a:fld>
             <a:endParaRPr lang="zh-CN" altLang="en-US"/>
           </a:p>
@@ -882,7 +882,7 @@
           <a:p>
             <a:fld id="{60D1E923-7CB1-4592-99E2-DF465806760B}" type="datetimeFigureOut">
               <a:rPr lang="zh-CN" altLang="en-US" smtClean="0"/>
-              <a:t>2021/2/20</a:t>
+              <a:t>2021/2/21</a:t>
             </a:fld>
             <a:endParaRPr lang="zh-CN" altLang="en-US"/>
           </a:p>
@@ -1158,7 +1158,7 @@
           <a:p>
             <a:fld id="{60D1E923-7CB1-4592-99E2-DF465806760B}" type="datetimeFigureOut">
               <a:rPr lang="zh-CN" altLang="en-US" smtClean="0"/>
-              <a:t>2021/2/20</a:t>
+              <a:t>2021/2/21</a:t>
             </a:fld>
             <a:endParaRPr lang="zh-CN" altLang="en-US"/>
           </a:p>
@@ -1426,7 +1426,7 @@
           <a:p>
             <a:fld id="{60D1E923-7CB1-4592-99E2-DF465806760B}" type="datetimeFigureOut">
               <a:rPr lang="zh-CN" altLang="en-US" smtClean="0"/>
-              <a:t>2021/2/20</a:t>
+              <a:t>2021/2/21</a:t>
             </a:fld>
             <a:endParaRPr lang="zh-CN" altLang="en-US"/>
           </a:p>
@@ -1841,7 +1841,7 @@
           <a:p>
             <a:fld id="{60D1E923-7CB1-4592-99E2-DF465806760B}" type="datetimeFigureOut">
               <a:rPr lang="zh-CN" altLang="en-US" smtClean="0"/>
-              <a:t>2021/2/20</a:t>
+              <a:t>2021/2/21</a:t>
             </a:fld>
             <a:endParaRPr lang="zh-CN" altLang="en-US"/>
           </a:p>
@@ -1983,7 +1983,7 @@
           <a:p>
             <a:fld id="{60D1E923-7CB1-4592-99E2-DF465806760B}" type="datetimeFigureOut">
               <a:rPr lang="zh-CN" altLang="en-US" smtClean="0"/>
-              <a:t>2021/2/20</a:t>
+              <a:t>2021/2/21</a:t>
             </a:fld>
             <a:endParaRPr lang="zh-CN" altLang="en-US"/>
           </a:p>
@@ -2096,7 +2096,7 @@
           <a:p>
             <a:fld id="{60D1E923-7CB1-4592-99E2-DF465806760B}" type="datetimeFigureOut">
               <a:rPr lang="zh-CN" altLang="en-US" smtClean="0"/>
-              <a:t>2021/2/20</a:t>
+              <a:t>2021/2/21</a:t>
             </a:fld>
             <a:endParaRPr lang="zh-CN" altLang="en-US"/>
           </a:p>
@@ -2409,7 +2409,7 @@
           <a:p>
             <a:fld id="{60D1E923-7CB1-4592-99E2-DF465806760B}" type="datetimeFigureOut">
               <a:rPr lang="zh-CN" altLang="en-US" smtClean="0"/>
-              <a:t>2021/2/20</a:t>
+              <a:t>2021/2/21</a:t>
             </a:fld>
             <a:endParaRPr lang="zh-CN" altLang="en-US"/>
           </a:p>
@@ -2698,7 +2698,7 @@
           <a:p>
             <a:fld id="{60D1E923-7CB1-4592-99E2-DF465806760B}" type="datetimeFigureOut">
               <a:rPr lang="zh-CN" altLang="en-US" smtClean="0"/>
-              <a:t>2021/2/20</a:t>
+              <a:t>2021/2/21</a:t>
             </a:fld>
             <a:endParaRPr lang="zh-CN" altLang="en-US"/>
           </a:p>
@@ -2941,7 +2941,7 @@
           <a:p>
             <a:fld id="{60D1E923-7CB1-4592-99E2-DF465806760B}" type="datetimeFigureOut">
               <a:rPr lang="zh-CN" altLang="en-US" smtClean="0"/>
-              <a:t>2021/2/20</a:t>
+              <a:t>2021/2/21</a:t>
             </a:fld>
             <a:endParaRPr lang="zh-CN" altLang="en-US"/>
           </a:p>
@@ -3625,14 +3625,165 @@
           <a:lstStyle/>
           <a:p>
             <a:r>
-              <a:rPr lang="de-DE" altLang="zh-CN">
-                <a:solidFill>
-                  <a:schemeClr val="bg1"/>
-                </a:solidFill>
-              </a:rPr>
-              <a:t>Classification with 1.883 different coins</a:t>
-            </a:r>
-            <a:endParaRPr lang="zh-CN" altLang="en-US">
+              <a:rPr lang="de-DE" altLang="zh-CN" dirty="0">
+                <a:solidFill>
+                  <a:schemeClr val="bg1"/>
+                </a:solidFill>
+              </a:rPr>
+              <a:t>Classification </a:t>
+            </a:r>
+            <a:r>
+              <a:rPr lang="de-DE" altLang="zh-CN" dirty="0" err="1">
+                <a:solidFill>
+                  <a:schemeClr val="bg1"/>
+                </a:solidFill>
+              </a:rPr>
+              <a:t>with</a:t>
+            </a:r>
+            <a:r>
+              <a:rPr lang="de-DE" altLang="zh-CN" dirty="0">
+                <a:solidFill>
+                  <a:schemeClr val="bg1"/>
+                </a:solidFill>
+              </a:rPr>
+              <a:t> 1.883 different </a:t>
+            </a:r>
+            <a:r>
+              <a:rPr lang="de-DE" altLang="zh-CN" dirty="0" err="1">
+                <a:solidFill>
+                  <a:schemeClr val="bg1"/>
+                </a:solidFill>
+              </a:rPr>
+              <a:t>coins</a:t>
+            </a:r>
+            <a:br>
+              <a:rPr lang="de-DE" altLang="zh-CN" dirty="0">
+                <a:solidFill>
+                  <a:schemeClr val="bg1"/>
+                </a:solidFill>
+              </a:rPr>
+            </a:br>
+            <a:r>
+              <a:rPr lang="de-DE" altLang="zh-CN" sz="1800" dirty="0">
+                <a:solidFill>
+                  <a:schemeClr val="bg1"/>
+                </a:solidFill>
+              </a:rPr>
+              <a:t>Data: API </a:t>
+            </a:r>
+            <a:r>
+              <a:rPr lang="de-DE" altLang="zh-CN" sz="1800" dirty="0" err="1">
+                <a:solidFill>
+                  <a:schemeClr val="bg1"/>
+                </a:solidFill>
+              </a:rPr>
+              <a:t>Coingecko</a:t>
+            </a:r>
+            <a:r>
+              <a:rPr lang="de-DE" altLang="zh-CN" sz="1800" dirty="0">
+                <a:solidFill>
+                  <a:schemeClr val="bg1"/>
+                </a:solidFill>
+              </a:rPr>
+              <a:t> </a:t>
+            </a:r>
+            <a:r>
+              <a:rPr lang="de-DE" altLang="zh-CN" sz="1800" dirty="0" err="1">
+                <a:solidFill>
+                  <a:schemeClr val="bg1"/>
+                </a:solidFill>
+              </a:rPr>
+              <a:t>available</a:t>
+            </a:r>
+            <a:r>
+              <a:rPr lang="de-DE" altLang="zh-CN" sz="1800" dirty="0">
+                <a:solidFill>
+                  <a:schemeClr val="bg1"/>
+                </a:solidFill>
+              </a:rPr>
+              <a:t> </a:t>
+            </a:r>
+            <a:r>
+              <a:rPr lang="de-DE" altLang="zh-CN" sz="1800" dirty="0" err="1">
+                <a:solidFill>
+                  <a:schemeClr val="bg1"/>
+                </a:solidFill>
+              </a:rPr>
+              <a:t>coins</a:t>
+            </a:r>
+            <a:r>
+              <a:rPr lang="de-DE" altLang="zh-CN" sz="1800" dirty="0">
+                <a:solidFill>
+                  <a:schemeClr val="bg1"/>
+                </a:solidFill>
+              </a:rPr>
+              <a:t> </a:t>
+            </a:r>
+            <a:r>
+              <a:rPr lang="de-DE" altLang="zh-CN" sz="1800" dirty="0" err="1">
+                <a:solidFill>
+                  <a:schemeClr val="bg1"/>
+                </a:solidFill>
+              </a:rPr>
+              <a:t>with</a:t>
+            </a:r>
+            <a:r>
+              <a:rPr lang="de-DE" altLang="zh-CN" sz="1800" dirty="0">
+                <a:solidFill>
+                  <a:schemeClr val="bg1"/>
+                </a:solidFill>
+              </a:rPr>
+              <a:t> </a:t>
+            </a:r>
+            <a:r>
+              <a:rPr lang="de-DE" altLang="zh-CN" sz="1800" dirty="0" err="1">
+                <a:solidFill>
+                  <a:schemeClr val="bg1"/>
+                </a:solidFill>
+              </a:rPr>
+              <a:t>return</a:t>
+            </a:r>
+            <a:r>
+              <a:rPr lang="de-DE" altLang="zh-CN" sz="1800" dirty="0">
+                <a:solidFill>
+                  <a:schemeClr val="bg1"/>
+                </a:solidFill>
+              </a:rPr>
+              <a:t> </a:t>
+            </a:r>
+            <a:r>
+              <a:rPr lang="de-DE" altLang="zh-CN" sz="1800" dirty="0" err="1">
+                <a:solidFill>
+                  <a:schemeClr val="bg1"/>
+                </a:solidFill>
+              </a:rPr>
+              <a:t>from</a:t>
+            </a:r>
+            <a:r>
+              <a:rPr lang="de-DE" altLang="zh-CN" sz="1800" dirty="0">
+                <a:solidFill>
+                  <a:schemeClr val="bg1"/>
+                </a:solidFill>
+              </a:rPr>
+              <a:t> 01.08.19 </a:t>
+            </a:r>
+            <a:r>
+              <a:rPr lang="de-DE" altLang="zh-CN" sz="1800" dirty="0" err="1">
+                <a:solidFill>
+                  <a:schemeClr val="bg1"/>
+                </a:solidFill>
+              </a:rPr>
+              <a:t>to</a:t>
+            </a:r>
+            <a:r>
+              <a:rPr lang="de-DE" altLang="zh-CN" sz="1800" dirty="0">
+                <a:solidFill>
+                  <a:schemeClr val="bg1"/>
+                </a:solidFill>
+              </a:rPr>
+              <a:t> 31.12.19</a:t>
+            </a:r>
+            <a:endParaRPr lang="zh-CN" altLang="en-US" sz="1800" dirty="0">
               <a:solidFill>
                 <a:schemeClr val="bg1"/>
               </a:solidFill>

</xml_diff>